<commit_message>
Added intermediate and advanced slides.
</commit_message>
<xml_diff>
--- a/Entity Framework Core.pptx
+++ b/Entity Framework Core.pptx
@@ -16,6 +16,8 @@
     <p:sldId id="265" r:id="rId10"/>
     <p:sldId id="266" r:id="rId11"/>
     <p:sldId id="258" r:id="rId12"/>
+    <p:sldId id="267" r:id="rId13"/>
+    <p:sldId id="268" r:id="rId14"/>
   </p:sldIdLst>
   <p:sldSz cx="12192000" cy="6858000"/>
   <p:notesSz cx="6858000" cy="9144000"/>
@@ -293,7 +295,7 @@
           <a:p>
             <a:fld id="{48A87A34-81AB-432B-8DAE-1953F412C126}" type="datetimeFigureOut">
               <a:rPr lang="en-US" dirty="0"/>
-              <a:t>10/21/2016</a:t>
+              <a:t>10/23/2016</a:t>
             </a:fld>
             <a:endParaRPr lang="en-US" dirty="0"/>
           </a:p>
@@ -603,7 +605,7 @@
           <a:p>
             <a:fld id="{48A87A34-81AB-432B-8DAE-1953F412C126}" type="datetimeFigureOut">
               <a:rPr lang="en-US" dirty="0"/>
-              <a:t>10/21/2016</a:t>
+              <a:t>10/23/2016</a:t>
             </a:fld>
             <a:endParaRPr lang="en-US" dirty="0"/>
           </a:p>
@@ -820,7 +822,7 @@
           <a:p>
             <a:fld id="{48A87A34-81AB-432B-8DAE-1953F412C126}" type="datetimeFigureOut">
               <a:rPr lang="en-US" dirty="0"/>
-              <a:t>10/21/2016</a:t>
+              <a:t>10/23/2016</a:t>
             </a:fld>
             <a:endParaRPr lang="en-US" dirty="0"/>
           </a:p>
@@ -1106,7 +1108,7 @@
           <a:p>
             <a:fld id="{48A87A34-81AB-432B-8DAE-1953F412C126}" type="datetimeFigureOut">
               <a:rPr lang="en-US" dirty="0"/>
-              <a:t>10/21/2016</a:t>
+              <a:t>10/23/2016</a:t>
             </a:fld>
             <a:endParaRPr lang="en-US" dirty="0"/>
           </a:p>
@@ -1555,7 +1557,7 @@
           <a:p>
             <a:fld id="{48A87A34-81AB-432B-8DAE-1953F412C126}" type="datetimeFigureOut">
               <a:rPr lang="en-US" dirty="0"/>
-              <a:t>10/21/2016</a:t>
+              <a:t>10/23/2016</a:t>
             </a:fld>
             <a:endParaRPr lang="en-US" dirty="0"/>
           </a:p>
@@ -2126,7 +2128,7 @@
           <a:p>
             <a:fld id="{48A87A34-81AB-432B-8DAE-1953F412C126}" type="datetimeFigureOut">
               <a:rPr lang="en-US" dirty="0"/>
-              <a:t>10/21/2016</a:t>
+              <a:t>10/23/2016</a:t>
             </a:fld>
             <a:endParaRPr lang="en-US" dirty="0"/>
           </a:p>
@@ -2982,7 +2984,7 @@
           <a:p>
             <a:fld id="{48A87A34-81AB-432B-8DAE-1953F412C126}" type="datetimeFigureOut">
               <a:rPr lang="en-US" dirty="0"/>
-              <a:t>10/21/2016</a:t>
+              <a:t>10/23/2016</a:t>
             </a:fld>
             <a:endParaRPr lang="en-US" dirty="0"/>
           </a:p>
@@ -3182,7 +3184,7 @@
           <a:p>
             <a:fld id="{48A87A34-81AB-432B-8DAE-1953F412C126}" type="datetimeFigureOut">
               <a:rPr lang="en-US" dirty="0"/>
-              <a:t>10/21/2016</a:t>
+              <a:t>10/23/2016</a:t>
             </a:fld>
             <a:endParaRPr lang="en-US" dirty="0"/>
           </a:p>
@@ -3391,7 +3393,7 @@
           <a:p>
             <a:fld id="{48A87A34-81AB-432B-8DAE-1953F412C126}" type="datetimeFigureOut">
               <a:rPr lang="en-US" dirty="0"/>
-              <a:t>10/21/2016</a:t>
+              <a:t>10/23/2016</a:t>
             </a:fld>
             <a:endParaRPr lang="en-US" dirty="0"/>
           </a:p>
@@ -3591,7 +3593,7 @@
           <a:p>
             <a:fld id="{48A87A34-81AB-432B-8DAE-1953F412C126}" type="datetimeFigureOut">
               <a:rPr lang="en-US" dirty="0"/>
-              <a:t>10/21/2016</a:t>
+              <a:t>10/23/2016</a:t>
             </a:fld>
             <a:endParaRPr lang="en-US" dirty="0"/>
           </a:p>
@@ -3866,7 +3868,7 @@
           <a:p>
             <a:fld id="{48A87A34-81AB-432B-8DAE-1953F412C126}" type="datetimeFigureOut">
               <a:rPr lang="en-US" dirty="0"/>
-              <a:t>10/21/2016</a:t>
+              <a:t>10/23/2016</a:t>
             </a:fld>
             <a:endParaRPr lang="en-US" dirty="0"/>
           </a:p>
@@ -4128,7 +4130,7 @@
           <a:p>
             <a:fld id="{48A87A34-81AB-432B-8DAE-1953F412C126}" type="datetimeFigureOut">
               <a:rPr lang="en-US" dirty="0"/>
-              <a:t>10/21/2016</a:t>
+              <a:t>10/23/2016</a:t>
             </a:fld>
             <a:endParaRPr lang="en-US" dirty="0"/>
           </a:p>
@@ -4538,7 +4540,7 @@
           <a:p>
             <a:fld id="{48A87A34-81AB-432B-8DAE-1953F412C126}" type="datetimeFigureOut">
               <a:rPr lang="en-US" dirty="0"/>
-              <a:t>10/21/2016</a:t>
+              <a:t>10/23/2016</a:t>
             </a:fld>
             <a:endParaRPr lang="en-US" dirty="0"/>
           </a:p>
@@ -4681,7 +4683,7 @@
           <a:p>
             <a:fld id="{48A87A34-81AB-432B-8DAE-1953F412C126}" type="datetimeFigureOut">
               <a:rPr lang="en-US" dirty="0"/>
-              <a:t>10/21/2016</a:t>
+              <a:t>10/23/2016</a:t>
             </a:fld>
             <a:endParaRPr lang="en-US" dirty="0"/>
           </a:p>
@@ -4801,7 +4803,7 @@
           <a:p>
             <a:fld id="{48A87A34-81AB-432B-8DAE-1953F412C126}" type="datetimeFigureOut">
               <a:rPr lang="en-US" dirty="0"/>
-              <a:t>10/21/2016</a:t>
+              <a:t>10/23/2016</a:t>
             </a:fld>
             <a:endParaRPr lang="en-US" dirty="0"/>
           </a:p>
@@ -5075,7 +5077,7 @@
           <a:p>
             <a:fld id="{48A87A34-81AB-432B-8DAE-1953F412C126}" type="datetimeFigureOut">
               <a:rPr lang="en-US" dirty="0"/>
-              <a:t>10/21/2016</a:t>
+              <a:t>10/23/2016</a:t>
             </a:fld>
             <a:endParaRPr lang="en-US" dirty="0"/>
           </a:p>
@@ -5385,7 +5387,7 @@
           <a:p>
             <a:fld id="{48A87A34-81AB-432B-8DAE-1953F412C126}" type="datetimeFigureOut">
               <a:rPr lang="en-US" dirty="0"/>
-              <a:t>10/21/2016</a:t>
+              <a:t>10/23/2016</a:t>
             </a:fld>
             <a:endParaRPr lang="en-US" dirty="0"/>
           </a:p>
@@ -5634,7 +5636,7 @@
             <a:fld id="{48A87A34-81AB-432B-8DAE-1953F412C126}" type="datetimeFigureOut">
               <a:rPr lang="en-US" dirty="0"/>
               <a:pPr/>
-              <a:t>10/21/2016</a:t>
+              <a:t>10/23/2016</a:t>
             </a:fld>
             <a:endParaRPr lang="en-US" dirty="0"/>
           </a:p>
@@ -6509,6 +6511,276 @@
 </p:sld>
 </file>
 
+<file path=ppt/slides/slide12.xml><?xml version="1.0" encoding="utf-8"?>
+<p:sld xmlns:a="http://schemas.openxmlformats.org/drawingml/2006/main" xmlns:r="http://schemas.openxmlformats.org/officeDocument/2006/relationships" xmlns:p="http://schemas.openxmlformats.org/presentationml/2006/main">
+  <p:cSld>
+    <p:spTree>
+      <p:nvGrpSpPr>
+        <p:cNvPr id="1" name=""/>
+        <p:cNvGrpSpPr/>
+        <p:nvPr/>
+      </p:nvGrpSpPr>
+      <p:grpSpPr>
+        <a:xfrm>
+          <a:off x="0" y="0"/>
+          <a:ext cx="0" cy="0"/>
+          <a:chOff x="0" y="0"/>
+          <a:chExt cx="0" cy="0"/>
+        </a:xfrm>
+      </p:grpSpPr>
+      <p:sp>
+        <p:nvSpPr>
+          <p:cNvPr id="2" name="Title 1"/>
+          <p:cNvSpPr>
+            <a:spLocks noGrp="1"/>
+          </p:cNvSpPr>
+          <p:nvPr>
+            <p:ph type="title"/>
+          </p:nvPr>
+        </p:nvSpPr>
+        <p:spPr/>
+        <p:txBody>
+          <a:bodyPr/>
+          <a:lstStyle/>
+          <a:p>
+            <a:r>
+              <a:rPr lang="en-US" dirty="0"/>
+              <a:t>INTERMEDIATE</a:t>
+            </a:r>
+          </a:p>
+        </p:txBody>
+      </p:sp>
+      <p:sp>
+        <p:nvSpPr>
+          <p:cNvPr id="3" name="TextBox 2"/>
+          <p:cNvSpPr txBox="1"/>
+          <p:nvPr/>
+        </p:nvSpPr>
+        <p:spPr>
+          <a:xfrm>
+            <a:off x="839585" y="2044931"/>
+            <a:ext cx="10532226" cy="1569660"/>
+          </a:xfrm>
+          <a:prstGeom prst="rect">
+            <a:avLst/>
+          </a:prstGeom>
+          <a:noFill/>
+        </p:spPr>
+        <p:txBody>
+          <a:bodyPr wrap="square" rtlCol="0">
+            <a:spAutoFit/>
+          </a:bodyPr>
+          <a:lstStyle/>
+          <a:p>
+            <a:pPr marL="457200" indent="-457200">
+              <a:buFont typeface="Arial" panose="020B0604020202020204" pitchFamily="34" charset="0"/>
+              <a:buChar char="•"/>
+            </a:pPr>
+            <a:r>
+              <a:rPr lang="en-US" sz="3200" dirty="0"/>
+              <a:t>Separate duties with a repository and </a:t>
+            </a:r>
+            <a:r>
+              <a:rPr lang="en-US" sz="3200" dirty="0" err="1"/>
+              <a:t>DbContext</a:t>
+            </a:r>
+            <a:endParaRPr lang="en-US" sz="3200" dirty="0"/>
+          </a:p>
+          <a:p>
+            <a:pPr marL="457200" indent="-457200">
+              <a:buFont typeface="Arial" panose="020B0604020202020204" pitchFamily="34" charset="0"/>
+              <a:buChar char="•"/>
+            </a:pPr>
+            <a:r>
+              <a:rPr lang="en-US" sz="3200" dirty="0"/>
+              <a:t>More data entity attributes to customize the database</a:t>
+            </a:r>
+          </a:p>
+          <a:p>
+            <a:pPr marL="457200" indent="-457200">
+              <a:buFont typeface="Arial" panose="020B0604020202020204" pitchFamily="34" charset="0"/>
+              <a:buChar char="•"/>
+            </a:pPr>
+            <a:r>
+              <a:rPr lang="en-US" sz="3200" dirty="0"/>
+              <a:t>A simple stored procedure call</a:t>
+            </a:r>
+          </a:p>
+        </p:txBody>
+      </p:sp>
+    </p:spTree>
+    <p:extLst>
+      <p:ext uri="{BB962C8B-B14F-4D97-AF65-F5344CB8AC3E}">
+        <p14:creationId xmlns:p14="http://schemas.microsoft.com/office/powerpoint/2010/main" val="3125281224"/>
+      </p:ext>
+    </p:extLst>
+  </p:cSld>
+  <p:clrMapOvr>
+    <a:masterClrMapping/>
+  </p:clrMapOvr>
+</p:sld>
+</file>
+
+<file path=ppt/slides/slide13.xml><?xml version="1.0" encoding="utf-8"?>
+<p:sld xmlns:a="http://schemas.openxmlformats.org/drawingml/2006/main" xmlns:r="http://schemas.openxmlformats.org/officeDocument/2006/relationships" xmlns:p="http://schemas.openxmlformats.org/presentationml/2006/main">
+  <p:cSld>
+    <p:spTree>
+      <p:nvGrpSpPr>
+        <p:cNvPr id="1" name=""/>
+        <p:cNvGrpSpPr/>
+        <p:nvPr/>
+      </p:nvGrpSpPr>
+      <p:grpSpPr>
+        <a:xfrm>
+          <a:off x="0" y="0"/>
+          <a:ext cx="0" cy="0"/>
+          <a:chOff x="0" y="0"/>
+          <a:chExt cx="0" cy="0"/>
+        </a:xfrm>
+      </p:grpSpPr>
+      <p:sp>
+        <p:nvSpPr>
+          <p:cNvPr id="2" name="Title 1"/>
+          <p:cNvSpPr>
+            <a:spLocks noGrp="1"/>
+          </p:cNvSpPr>
+          <p:nvPr>
+            <p:ph type="title"/>
+          </p:nvPr>
+        </p:nvSpPr>
+        <p:spPr/>
+        <p:txBody>
+          <a:bodyPr/>
+          <a:lstStyle/>
+          <a:p>
+            <a:r>
+              <a:rPr lang="en-US" dirty="0"/>
+              <a:t>advanced</a:t>
+            </a:r>
+          </a:p>
+        </p:txBody>
+      </p:sp>
+      <p:sp>
+        <p:nvSpPr>
+          <p:cNvPr id="3" name="TextBox 2"/>
+          <p:cNvSpPr txBox="1"/>
+          <p:nvPr/>
+        </p:nvSpPr>
+        <p:spPr>
+          <a:xfrm>
+            <a:off x="839585" y="2044931"/>
+            <a:ext cx="10532226" cy="1938992"/>
+          </a:xfrm>
+          <a:prstGeom prst="rect">
+            <a:avLst/>
+          </a:prstGeom>
+          <a:noFill/>
+        </p:spPr>
+        <p:txBody>
+          <a:bodyPr wrap="square" rtlCol="0">
+            <a:spAutoFit/>
+          </a:bodyPr>
+          <a:lstStyle/>
+          <a:p>
+            <a:pPr marL="457200" indent="-457200">
+              <a:buFont typeface="Arial" panose="020B0604020202020204" pitchFamily="34" charset="0"/>
+              <a:buChar char="•"/>
+            </a:pPr>
+            <a:r>
+              <a:rPr lang="en-US" sz="3000" dirty="0"/>
+              <a:t>Calling a stored procedure with a User Defined Table Type</a:t>
+            </a:r>
+          </a:p>
+          <a:p>
+            <a:pPr marL="457200" indent="-457200">
+              <a:buFont typeface="Arial" panose="020B0604020202020204" pitchFamily="34" charset="0"/>
+              <a:buChar char="•"/>
+            </a:pPr>
+            <a:r>
+              <a:rPr lang="en-US" sz="3000" dirty="0"/>
+              <a:t>Code </a:t>
+            </a:r>
+            <a:r>
+              <a:rPr lang="en-US" sz="3000" dirty="0" err="1"/>
+              <a:t>shareing</a:t>
+            </a:r>
+            <a:r>
+              <a:rPr lang="en-US" sz="3000" dirty="0"/>
+              <a:t> between </a:t>
+            </a:r>
+            <a:r>
+              <a:rPr lang="en-US" sz="3000" dirty="0" err="1"/>
+              <a:t>.Net</a:t>
+            </a:r>
+            <a:r>
+              <a:rPr lang="en-US" sz="3000" dirty="0"/>
+              <a:t> Core and </a:t>
+            </a:r>
+            <a:r>
+              <a:rPr lang="en-US" sz="3000" dirty="0" err="1"/>
+              <a:t>.Net</a:t>
+            </a:r>
+            <a:r>
+              <a:rPr lang="en-US" sz="3000" dirty="0"/>
+              <a:t> Old</a:t>
+            </a:r>
+          </a:p>
+          <a:p>
+            <a:pPr marL="457200" indent="-457200">
+              <a:buFont typeface="Arial" panose="020B0604020202020204" pitchFamily="34" charset="0"/>
+              <a:buChar char="•"/>
+            </a:pPr>
+            <a:r>
+              <a:rPr lang="en-US" sz="3000" dirty="0"/>
+              <a:t>Repository with </a:t>
+            </a:r>
+            <a:r>
+              <a:rPr lang="en-US" sz="3000" dirty="0" err="1"/>
+              <a:t>ModelBuilder</a:t>
+            </a:r>
+            <a:r>
+              <a:rPr lang="en-US" sz="3000" dirty="0"/>
+              <a:t> mapping (no attributes on POCOs)</a:t>
+            </a:r>
+          </a:p>
+          <a:p>
+            <a:pPr marL="457200" indent="-457200">
+              <a:buFont typeface="Arial" panose="020B0604020202020204" pitchFamily="34" charset="0"/>
+              <a:buChar char="•"/>
+            </a:pPr>
+            <a:r>
+              <a:rPr lang="en-US" sz="3000" dirty="0"/>
+              <a:t>Abstracting the </a:t>
+            </a:r>
+            <a:r>
+              <a:rPr lang="en-US" sz="3000" dirty="0" err="1"/>
+              <a:t>ModelBuilder</a:t>
+            </a:r>
+            <a:r>
+              <a:rPr lang="en-US" sz="3000" dirty="0"/>
+              <a:t> and </a:t>
+            </a:r>
+            <a:r>
+              <a:rPr lang="en-US" sz="3000" dirty="0" err="1"/>
+              <a:t>DbModelBuilder</a:t>
+            </a:r>
+            <a:endParaRPr lang="en-US" sz="3000" dirty="0"/>
+          </a:p>
+        </p:txBody>
+      </p:sp>
+    </p:spTree>
+    <p:extLst>
+      <p:ext uri="{BB962C8B-B14F-4D97-AF65-F5344CB8AC3E}">
+        <p14:creationId xmlns:p14="http://schemas.microsoft.com/office/powerpoint/2010/main" val="1063818817"/>
+      </p:ext>
+    </p:extLst>
+  </p:cSld>
+  <p:clrMapOvr>
+    <a:masterClrMapping/>
+  </p:clrMapOvr>
+</p:sld>
+</file>
+
 <file path=ppt/slides/slide2.xml><?xml version="1.0" encoding="utf-8"?>
 <p:sld xmlns:a="http://schemas.openxmlformats.org/drawingml/2006/main" xmlns:r="http://schemas.openxmlformats.org/officeDocument/2006/relationships" xmlns:p="http://schemas.openxmlformats.org/presentationml/2006/main">
   <p:cSld>

</xml_diff>

<commit_message>
Added Spilled Milk logo
</commit_message>
<xml_diff>
--- a/Entity Framework Core.pptx
+++ b/Entity Framework Core.pptx
@@ -296,7 +296,7 @@
           <a:p>
             <a:fld id="{48A87A34-81AB-432B-8DAE-1953F412C126}" type="datetimeFigureOut">
               <a:rPr lang="en-US" dirty="0"/>
-              <a:t>10/26/2016</a:t>
+              <a:t>10/27/2016</a:t>
             </a:fld>
             <a:endParaRPr lang="en-US" dirty="0"/>
           </a:p>
@@ -606,7 +606,7 @@
           <a:p>
             <a:fld id="{48A87A34-81AB-432B-8DAE-1953F412C126}" type="datetimeFigureOut">
               <a:rPr lang="en-US" dirty="0"/>
-              <a:t>10/26/2016</a:t>
+              <a:t>10/27/2016</a:t>
             </a:fld>
             <a:endParaRPr lang="en-US" dirty="0"/>
           </a:p>
@@ -823,7 +823,7 @@
           <a:p>
             <a:fld id="{48A87A34-81AB-432B-8DAE-1953F412C126}" type="datetimeFigureOut">
               <a:rPr lang="en-US" dirty="0"/>
-              <a:t>10/26/2016</a:t>
+              <a:t>10/27/2016</a:t>
             </a:fld>
             <a:endParaRPr lang="en-US" dirty="0"/>
           </a:p>
@@ -1109,7 +1109,7 @@
           <a:p>
             <a:fld id="{48A87A34-81AB-432B-8DAE-1953F412C126}" type="datetimeFigureOut">
               <a:rPr lang="en-US" dirty="0"/>
-              <a:t>10/26/2016</a:t>
+              <a:t>10/27/2016</a:t>
             </a:fld>
             <a:endParaRPr lang="en-US" dirty="0"/>
           </a:p>
@@ -1558,7 +1558,7 @@
           <a:p>
             <a:fld id="{48A87A34-81AB-432B-8DAE-1953F412C126}" type="datetimeFigureOut">
               <a:rPr lang="en-US" dirty="0"/>
-              <a:t>10/26/2016</a:t>
+              <a:t>10/27/2016</a:t>
             </a:fld>
             <a:endParaRPr lang="en-US" dirty="0"/>
           </a:p>
@@ -2129,7 +2129,7 @@
           <a:p>
             <a:fld id="{48A87A34-81AB-432B-8DAE-1953F412C126}" type="datetimeFigureOut">
               <a:rPr lang="en-US" dirty="0"/>
-              <a:t>10/26/2016</a:t>
+              <a:t>10/27/2016</a:t>
             </a:fld>
             <a:endParaRPr lang="en-US" dirty="0"/>
           </a:p>
@@ -2985,7 +2985,7 @@
           <a:p>
             <a:fld id="{48A87A34-81AB-432B-8DAE-1953F412C126}" type="datetimeFigureOut">
               <a:rPr lang="en-US" dirty="0"/>
-              <a:t>10/26/2016</a:t>
+              <a:t>10/27/2016</a:t>
             </a:fld>
             <a:endParaRPr lang="en-US" dirty="0"/>
           </a:p>
@@ -3185,7 +3185,7 @@
           <a:p>
             <a:fld id="{48A87A34-81AB-432B-8DAE-1953F412C126}" type="datetimeFigureOut">
               <a:rPr lang="en-US" dirty="0"/>
-              <a:t>10/26/2016</a:t>
+              <a:t>10/27/2016</a:t>
             </a:fld>
             <a:endParaRPr lang="en-US" dirty="0"/>
           </a:p>
@@ -3394,7 +3394,7 @@
           <a:p>
             <a:fld id="{48A87A34-81AB-432B-8DAE-1953F412C126}" type="datetimeFigureOut">
               <a:rPr lang="en-US" dirty="0"/>
-              <a:t>10/26/2016</a:t>
+              <a:t>10/27/2016</a:t>
             </a:fld>
             <a:endParaRPr lang="en-US" dirty="0"/>
           </a:p>
@@ -3594,7 +3594,7 @@
           <a:p>
             <a:fld id="{48A87A34-81AB-432B-8DAE-1953F412C126}" type="datetimeFigureOut">
               <a:rPr lang="en-US" dirty="0"/>
-              <a:t>10/26/2016</a:t>
+              <a:t>10/27/2016</a:t>
             </a:fld>
             <a:endParaRPr lang="en-US" dirty="0"/>
           </a:p>
@@ -3869,7 +3869,7 @@
           <a:p>
             <a:fld id="{48A87A34-81AB-432B-8DAE-1953F412C126}" type="datetimeFigureOut">
               <a:rPr lang="en-US" dirty="0"/>
-              <a:t>10/26/2016</a:t>
+              <a:t>10/27/2016</a:t>
             </a:fld>
             <a:endParaRPr lang="en-US" dirty="0"/>
           </a:p>
@@ -4131,7 +4131,7 @@
           <a:p>
             <a:fld id="{48A87A34-81AB-432B-8DAE-1953F412C126}" type="datetimeFigureOut">
               <a:rPr lang="en-US" dirty="0"/>
-              <a:t>10/26/2016</a:t>
+              <a:t>10/27/2016</a:t>
             </a:fld>
             <a:endParaRPr lang="en-US" dirty="0"/>
           </a:p>
@@ -4541,7 +4541,7 @@
           <a:p>
             <a:fld id="{48A87A34-81AB-432B-8DAE-1953F412C126}" type="datetimeFigureOut">
               <a:rPr lang="en-US" dirty="0"/>
-              <a:t>10/26/2016</a:t>
+              <a:t>10/27/2016</a:t>
             </a:fld>
             <a:endParaRPr lang="en-US" dirty="0"/>
           </a:p>
@@ -4684,7 +4684,7 @@
           <a:p>
             <a:fld id="{48A87A34-81AB-432B-8DAE-1953F412C126}" type="datetimeFigureOut">
               <a:rPr lang="en-US" dirty="0"/>
-              <a:t>10/26/2016</a:t>
+              <a:t>10/27/2016</a:t>
             </a:fld>
             <a:endParaRPr lang="en-US" dirty="0"/>
           </a:p>
@@ -4804,7 +4804,7 @@
           <a:p>
             <a:fld id="{48A87A34-81AB-432B-8DAE-1953F412C126}" type="datetimeFigureOut">
               <a:rPr lang="en-US" dirty="0"/>
-              <a:t>10/26/2016</a:t>
+              <a:t>10/27/2016</a:t>
             </a:fld>
             <a:endParaRPr lang="en-US" dirty="0"/>
           </a:p>
@@ -5078,7 +5078,7 @@
           <a:p>
             <a:fld id="{48A87A34-81AB-432B-8DAE-1953F412C126}" type="datetimeFigureOut">
               <a:rPr lang="en-US" dirty="0"/>
-              <a:t>10/26/2016</a:t>
+              <a:t>10/27/2016</a:t>
             </a:fld>
             <a:endParaRPr lang="en-US" dirty="0"/>
           </a:p>
@@ -5388,7 +5388,7 @@
           <a:p>
             <a:fld id="{48A87A34-81AB-432B-8DAE-1953F412C126}" type="datetimeFigureOut">
               <a:rPr lang="en-US" dirty="0"/>
-              <a:t>10/26/2016</a:t>
+              <a:t>10/27/2016</a:t>
             </a:fld>
             <a:endParaRPr lang="en-US" dirty="0"/>
           </a:p>
@@ -5637,7 +5637,7 @@
             <a:fld id="{48A87A34-81AB-432B-8DAE-1953F412C126}" type="datetimeFigureOut">
               <a:rPr lang="en-US" dirty="0"/>
               <a:pPr/>
-              <a:t>10/26/2016</a:t>
+              <a:t>10/27/2016</a:t>
             </a:fld>
             <a:endParaRPr lang="en-US" dirty="0"/>
           </a:p>
@@ -6442,6 +6442,30 @@
           </a:p>
         </p:txBody>
       </p:sp>
+      <p:pic>
+        <p:nvPicPr>
+          <p:cNvPr id="2" name="Picture 1"/>
+          <p:cNvPicPr>
+            <a:picLocks noChangeAspect="1"/>
+          </p:cNvPicPr>
+          <p:nvPr/>
+        </p:nvPicPr>
+        <p:blipFill>
+          <a:blip r:embed="rId6"/>
+          <a:stretch>
+            <a:fillRect/>
+          </a:stretch>
+        </p:blipFill>
+        <p:spPr>
+          <a:xfrm>
+            <a:off x="247132" y="5941538"/>
+            <a:ext cx="675506" cy="709282"/>
+          </a:xfrm>
+          <a:prstGeom prst="rect">
+            <a:avLst/>
+          </a:prstGeom>
+        </p:spPr>
+      </p:pic>
     </p:spTree>
     <p:extLst>
       <p:ext uri="{BB962C8B-B14F-4D97-AF65-F5344CB8AC3E}">
@@ -6960,13 +6984,36 @@
               <a:buChar char="•"/>
             </a:pPr>
             <a:r>
-              <a:rPr lang="en-US" sz="3200"/>
+              <a:rPr lang="en-US" sz="3200" dirty="0"/>
               <a:t>GitHub</a:t>
             </a:r>
-            <a:endParaRPr lang="en-US" sz="3200" dirty="0"/>
-          </a:p>
-        </p:txBody>
-      </p:sp>
+          </a:p>
+        </p:txBody>
+      </p:sp>
+      <p:pic>
+        <p:nvPicPr>
+          <p:cNvPr id="4" name="Picture 3"/>
+          <p:cNvPicPr>
+            <a:picLocks noChangeAspect="1"/>
+          </p:cNvPicPr>
+          <p:nvPr/>
+        </p:nvPicPr>
+        <p:blipFill>
+          <a:blip r:embed="rId5"/>
+          <a:stretch>
+            <a:fillRect/>
+          </a:stretch>
+        </p:blipFill>
+        <p:spPr>
+          <a:xfrm>
+            <a:off x="247132" y="5941538"/>
+            <a:ext cx="675506" cy="709282"/>
+          </a:xfrm>
+          <a:prstGeom prst="rect">
+            <a:avLst/>
+          </a:prstGeom>
+        </p:spPr>
+      </p:pic>
     </p:spTree>
     <p:extLst>
       <p:ext uri="{BB962C8B-B14F-4D97-AF65-F5344CB8AC3E}">

</xml_diff>

<commit_message>
Adding to slides.  Reorganizing tests.
</commit_message>
<xml_diff>
--- a/Entity Framework Core.pptx
+++ b/Entity Framework Core.pptx
@@ -7214,15 +7214,7 @@
             </a:pPr>
             <a:r>
               <a:rPr lang="en-US" sz="3000" dirty="0"/>
-              <a:t>Code </a:t>
-            </a:r>
-            <a:r>
-              <a:rPr lang="en-US" sz="3000" dirty="0" err="1"/>
-              <a:t>shareing</a:t>
-            </a:r>
-            <a:r>
-              <a:rPr lang="en-US" sz="3000" dirty="0"/>
-              <a:t> between </a:t>
+              <a:t>Code sharing between </a:t>
             </a:r>
             <a:r>
               <a:rPr lang="en-US" sz="3000" dirty="0" err="1"/>
@@ -8110,21 +8102,8 @@
             </a:pPr>
             <a:r>
               <a:rPr lang="en-US" sz="3200" dirty="0"/>
-              <a:t>Status – Statuses, </a:t>
-            </a:r>
-            <a:r>
-              <a:rPr lang="en-US" sz="3200" dirty="0" err="1"/>
-              <a:t>Statii</a:t>
-            </a:r>
-            <a:r>
-              <a:rPr lang="en-US" sz="3200" dirty="0"/>
-              <a:t>, </a:t>
-            </a:r>
-            <a:r>
-              <a:rPr lang="en-US" sz="3200" dirty="0" err="1"/>
-              <a:t>Statusii</a:t>
-            </a:r>
-            <a:endParaRPr lang="en-US" sz="3200" dirty="0"/>
+              <a:t>Status – Statuses</a:t>
+            </a:r>
           </a:p>
           <a:p>
             <a:pPr marL="457200" indent="-457200">
@@ -8216,7 +8195,7 @@
         <p:spPr>
           <a:xfrm>
             <a:off x="839585" y="2044931"/>
-            <a:ext cx="10532226" cy="1077218"/>
+            <a:ext cx="10532226" cy="3539430"/>
           </a:xfrm>
           <a:prstGeom prst="rect">
             <a:avLst/>
@@ -8237,6 +8216,61 @@
               <a:rPr lang="en-US" sz="3200" dirty="0"/>
               <a:t>First - Write your interface</a:t>
             </a:r>
+          </a:p>
+          <a:p>
+            <a:pPr marL="457200" indent="-457200">
+              <a:buFont typeface="Arial" panose="020B0604020202020204" pitchFamily="34" charset="0"/>
+              <a:buChar char="•"/>
+            </a:pPr>
+            <a:r>
+              <a:rPr lang="en-US" sz="3200" dirty="0"/>
+              <a:t>How about some basic CRUD?</a:t>
+            </a:r>
+          </a:p>
+          <a:p>
+            <a:pPr marL="914400" lvl="1" indent="-457200">
+              <a:buFont typeface="Arial" panose="020B0604020202020204" pitchFamily="34" charset="0"/>
+              <a:buChar char="•"/>
+            </a:pPr>
+            <a:r>
+              <a:rPr lang="en-US" sz="3200" dirty="0"/>
+              <a:t>Create (Add)</a:t>
+            </a:r>
+          </a:p>
+          <a:p>
+            <a:pPr marL="914400" lvl="1" indent="-457200">
+              <a:buFont typeface="Arial" panose="020B0604020202020204" pitchFamily="34" charset="0"/>
+              <a:buChar char="•"/>
+            </a:pPr>
+            <a:r>
+              <a:rPr lang="en-US" sz="3200" dirty="0"/>
+              <a:t>Read (Get)</a:t>
+            </a:r>
+          </a:p>
+          <a:p>
+            <a:pPr marL="914400" lvl="1" indent="-457200">
+              <a:buFont typeface="Arial" panose="020B0604020202020204" pitchFamily="34" charset="0"/>
+              <a:buChar char="•"/>
+            </a:pPr>
+            <a:r>
+              <a:rPr lang="en-US" sz="3200" dirty="0"/>
+              <a:t>Update</a:t>
+            </a:r>
+          </a:p>
+          <a:p>
+            <a:pPr marL="914400" lvl="1" indent="-457200">
+              <a:buFont typeface="Arial" panose="020B0604020202020204" pitchFamily="34" charset="0"/>
+              <a:buChar char="•"/>
+            </a:pPr>
+            <a:r>
+              <a:rPr lang="en-US" sz="3200" dirty="0"/>
+              <a:t>Delete (Remove) – In </a:t>
+            </a:r>
+            <a:r>
+              <a:rPr lang="en-US" sz="3200"/>
+              <a:t>unit tests</a:t>
+            </a:r>
+            <a:endParaRPr lang="en-US" sz="3200" dirty="0"/>
           </a:p>
           <a:p>
             <a:pPr marL="457200" indent="-457200">

</xml_diff>

<commit_message>
Some changes done AT the event.
</commit_message>
<xml_diff>
--- a/Entity Framework Core.pptx
+++ b/Entity Framework Core.pptx
@@ -19,6 +19,7 @@
     <p:sldId id="258" r:id="rId13"/>
     <p:sldId id="267" r:id="rId14"/>
     <p:sldId id="268" r:id="rId15"/>
+    <p:sldId id="270" r:id="rId16"/>
   </p:sldIdLst>
   <p:sldSz cx="12192000" cy="6858000"/>
   <p:notesSz cx="6858000" cy="9144000"/>
@@ -296,7 +297,7 @@
           <a:p>
             <a:fld id="{48A87A34-81AB-432B-8DAE-1953F412C126}" type="datetimeFigureOut">
               <a:rPr lang="en-US" dirty="0"/>
-              <a:t>10/27/2016</a:t>
+              <a:t>10/28/2016</a:t>
             </a:fld>
             <a:endParaRPr lang="en-US" dirty="0"/>
           </a:p>
@@ -606,7 +607,7 @@
           <a:p>
             <a:fld id="{48A87A34-81AB-432B-8DAE-1953F412C126}" type="datetimeFigureOut">
               <a:rPr lang="en-US" dirty="0"/>
-              <a:t>10/27/2016</a:t>
+              <a:t>10/28/2016</a:t>
             </a:fld>
             <a:endParaRPr lang="en-US" dirty="0"/>
           </a:p>
@@ -823,7 +824,7 @@
           <a:p>
             <a:fld id="{48A87A34-81AB-432B-8DAE-1953F412C126}" type="datetimeFigureOut">
               <a:rPr lang="en-US" dirty="0"/>
-              <a:t>10/27/2016</a:t>
+              <a:t>10/28/2016</a:t>
             </a:fld>
             <a:endParaRPr lang="en-US" dirty="0"/>
           </a:p>
@@ -1109,7 +1110,7 @@
           <a:p>
             <a:fld id="{48A87A34-81AB-432B-8DAE-1953F412C126}" type="datetimeFigureOut">
               <a:rPr lang="en-US" dirty="0"/>
-              <a:t>10/27/2016</a:t>
+              <a:t>10/28/2016</a:t>
             </a:fld>
             <a:endParaRPr lang="en-US" dirty="0"/>
           </a:p>
@@ -1558,7 +1559,7 @@
           <a:p>
             <a:fld id="{48A87A34-81AB-432B-8DAE-1953F412C126}" type="datetimeFigureOut">
               <a:rPr lang="en-US" dirty="0"/>
-              <a:t>10/27/2016</a:t>
+              <a:t>10/28/2016</a:t>
             </a:fld>
             <a:endParaRPr lang="en-US" dirty="0"/>
           </a:p>
@@ -2129,7 +2130,7 @@
           <a:p>
             <a:fld id="{48A87A34-81AB-432B-8DAE-1953F412C126}" type="datetimeFigureOut">
               <a:rPr lang="en-US" dirty="0"/>
-              <a:t>10/27/2016</a:t>
+              <a:t>10/28/2016</a:t>
             </a:fld>
             <a:endParaRPr lang="en-US" dirty="0"/>
           </a:p>
@@ -2985,7 +2986,7 @@
           <a:p>
             <a:fld id="{48A87A34-81AB-432B-8DAE-1953F412C126}" type="datetimeFigureOut">
               <a:rPr lang="en-US" dirty="0"/>
-              <a:t>10/27/2016</a:t>
+              <a:t>10/28/2016</a:t>
             </a:fld>
             <a:endParaRPr lang="en-US" dirty="0"/>
           </a:p>
@@ -3185,7 +3186,7 @@
           <a:p>
             <a:fld id="{48A87A34-81AB-432B-8DAE-1953F412C126}" type="datetimeFigureOut">
               <a:rPr lang="en-US" dirty="0"/>
-              <a:t>10/27/2016</a:t>
+              <a:t>10/28/2016</a:t>
             </a:fld>
             <a:endParaRPr lang="en-US" dirty="0"/>
           </a:p>
@@ -3394,7 +3395,7 @@
           <a:p>
             <a:fld id="{48A87A34-81AB-432B-8DAE-1953F412C126}" type="datetimeFigureOut">
               <a:rPr lang="en-US" dirty="0"/>
-              <a:t>10/27/2016</a:t>
+              <a:t>10/28/2016</a:t>
             </a:fld>
             <a:endParaRPr lang="en-US" dirty="0"/>
           </a:p>
@@ -3594,7 +3595,7 @@
           <a:p>
             <a:fld id="{48A87A34-81AB-432B-8DAE-1953F412C126}" type="datetimeFigureOut">
               <a:rPr lang="en-US" dirty="0"/>
-              <a:t>10/27/2016</a:t>
+              <a:t>10/28/2016</a:t>
             </a:fld>
             <a:endParaRPr lang="en-US" dirty="0"/>
           </a:p>
@@ -3869,7 +3870,7 @@
           <a:p>
             <a:fld id="{48A87A34-81AB-432B-8DAE-1953F412C126}" type="datetimeFigureOut">
               <a:rPr lang="en-US" dirty="0"/>
-              <a:t>10/27/2016</a:t>
+              <a:t>10/28/2016</a:t>
             </a:fld>
             <a:endParaRPr lang="en-US" dirty="0"/>
           </a:p>
@@ -4131,7 +4132,7 @@
           <a:p>
             <a:fld id="{48A87A34-81AB-432B-8DAE-1953F412C126}" type="datetimeFigureOut">
               <a:rPr lang="en-US" dirty="0"/>
-              <a:t>10/27/2016</a:t>
+              <a:t>10/28/2016</a:t>
             </a:fld>
             <a:endParaRPr lang="en-US" dirty="0"/>
           </a:p>
@@ -4541,7 +4542,7 @@
           <a:p>
             <a:fld id="{48A87A34-81AB-432B-8DAE-1953F412C126}" type="datetimeFigureOut">
               <a:rPr lang="en-US" dirty="0"/>
-              <a:t>10/27/2016</a:t>
+              <a:t>10/28/2016</a:t>
             </a:fld>
             <a:endParaRPr lang="en-US" dirty="0"/>
           </a:p>
@@ -4684,7 +4685,7 @@
           <a:p>
             <a:fld id="{48A87A34-81AB-432B-8DAE-1953F412C126}" type="datetimeFigureOut">
               <a:rPr lang="en-US" dirty="0"/>
-              <a:t>10/27/2016</a:t>
+              <a:t>10/28/2016</a:t>
             </a:fld>
             <a:endParaRPr lang="en-US" dirty="0"/>
           </a:p>
@@ -4804,7 +4805,7 @@
           <a:p>
             <a:fld id="{48A87A34-81AB-432B-8DAE-1953F412C126}" type="datetimeFigureOut">
               <a:rPr lang="en-US" dirty="0"/>
-              <a:t>10/27/2016</a:t>
+              <a:t>10/28/2016</a:t>
             </a:fld>
             <a:endParaRPr lang="en-US" dirty="0"/>
           </a:p>
@@ -5078,7 +5079,7 @@
           <a:p>
             <a:fld id="{48A87A34-81AB-432B-8DAE-1953F412C126}" type="datetimeFigureOut">
               <a:rPr lang="en-US" dirty="0"/>
-              <a:t>10/27/2016</a:t>
+              <a:t>10/28/2016</a:t>
             </a:fld>
             <a:endParaRPr lang="en-US" dirty="0"/>
           </a:p>
@@ -5388,7 +5389,7 @@
           <a:p>
             <a:fld id="{48A87A34-81AB-432B-8DAE-1953F412C126}" type="datetimeFigureOut">
               <a:rPr lang="en-US" dirty="0"/>
-              <a:t>10/27/2016</a:t>
+              <a:t>10/28/2016</a:t>
             </a:fld>
             <a:endParaRPr lang="en-US" dirty="0"/>
           </a:p>
@@ -5637,7 +5638,7 @@
             <a:fld id="{48A87A34-81AB-432B-8DAE-1953F412C126}" type="datetimeFigureOut">
               <a:rPr lang="en-US" dirty="0"/>
               <a:pPr/>
-              <a:t>10/27/2016</a:t>
+              <a:t>10/28/2016</a:t>
             </a:fld>
             <a:endParaRPr lang="en-US" dirty="0"/>
           </a:p>
@@ -7006,8 +7007,8 @@
         </p:blipFill>
         <p:spPr>
           <a:xfrm>
-            <a:off x="247132" y="5941538"/>
-            <a:ext cx="675506" cy="709282"/>
+            <a:off x="7811713" y="3641108"/>
+            <a:ext cx="1340599" cy="1407630"/>
           </a:xfrm>
           <a:prstGeom prst="rect">
             <a:avLst/>
@@ -7075,7 +7076,7 @@
         <p:spPr>
           <a:xfrm>
             <a:off x="839585" y="2044931"/>
-            <a:ext cx="10532226" cy="1569660"/>
+            <a:ext cx="10532226" cy="2062103"/>
           </a:xfrm>
           <a:prstGeom prst="rect">
             <a:avLst/>
@@ -7110,6 +7111,16 @@
             <a:r>
               <a:rPr lang="en-US" sz="3200" dirty="0"/>
               <a:t>More data entity attributes to customize the database</a:t>
+            </a:r>
+          </a:p>
+          <a:p>
+            <a:pPr marL="457200" indent="-457200">
+              <a:buFont typeface="Arial" panose="020B0604020202020204" pitchFamily="34" charset="0"/>
+              <a:buChar char="•"/>
+            </a:pPr>
+            <a:r>
+              <a:rPr lang="en-US" sz="3200" dirty="0"/>
+              <a:t>Data mappers to separate the business objects from data</a:t>
             </a:r>
           </a:p>
           <a:p>
@@ -7289,6 +7300,207 @@
 </p:sld>
 </file>
 
+<file path=ppt/slides/slide15.xml><?xml version="1.0" encoding="utf-8"?>
+<p:sld xmlns:a="http://schemas.openxmlformats.org/drawingml/2006/main" xmlns:r="http://schemas.openxmlformats.org/officeDocument/2006/relationships" xmlns:p="http://schemas.openxmlformats.org/presentationml/2006/main">
+  <p:cSld>
+    <p:spTree>
+      <p:nvGrpSpPr>
+        <p:cNvPr id="1" name=""/>
+        <p:cNvGrpSpPr/>
+        <p:nvPr/>
+      </p:nvGrpSpPr>
+      <p:grpSpPr>
+        <a:xfrm>
+          <a:off x="0" y="0"/>
+          <a:ext cx="0" cy="0"/>
+          <a:chOff x="0" y="0"/>
+          <a:chExt cx="0" cy="0"/>
+        </a:xfrm>
+      </p:grpSpPr>
+      <p:sp>
+        <p:nvSpPr>
+          <p:cNvPr id="2" name="Title 1"/>
+          <p:cNvSpPr>
+            <a:spLocks noGrp="1"/>
+          </p:cNvSpPr>
+          <p:nvPr>
+            <p:ph type="title"/>
+          </p:nvPr>
+        </p:nvSpPr>
+        <p:spPr/>
+        <p:txBody>
+          <a:bodyPr/>
+          <a:lstStyle/>
+          <a:p>
+            <a:r>
+              <a:rPr lang="en-US" dirty="0"/>
+              <a:t>? QUESTIONS ?</a:t>
+            </a:r>
+            <a:br>
+              <a:rPr lang="en-US" dirty="0"/>
+            </a:br>
+            <a:r>
+              <a:rPr lang="en-US" dirty="0"/>
+              <a:t>CONTACT</a:t>
+            </a:r>
+          </a:p>
+        </p:txBody>
+      </p:sp>
+      <p:sp>
+        <p:nvSpPr>
+          <p:cNvPr id="3" name="TextBox 2"/>
+          <p:cNvSpPr txBox="1"/>
+          <p:nvPr/>
+        </p:nvSpPr>
+        <p:spPr>
+          <a:xfrm>
+            <a:off x="839585" y="2044931"/>
+            <a:ext cx="10532226" cy="3539430"/>
+          </a:xfrm>
+          <a:prstGeom prst="rect">
+            <a:avLst/>
+          </a:prstGeom>
+          <a:noFill/>
+        </p:spPr>
+        <p:txBody>
+          <a:bodyPr wrap="square" rtlCol="0">
+            <a:spAutoFit/>
+          </a:bodyPr>
+          <a:lstStyle/>
+          <a:p>
+            <a:pPr marL="457200" indent="-457200">
+              <a:buFont typeface="Arial" panose="020B0604020202020204" pitchFamily="34" charset="0"/>
+              <a:buChar char="•"/>
+            </a:pPr>
+            <a:r>
+              <a:rPr lang="en-US" sz="3200" dirty="0">
+                <a:hlinkClick r:id="rId2"/>
+              </a:rPr>
+              <a:t>psmart@SpilledMilk.com</a:t>
+            </a:r>
+            <a:endParaRPr lang="en-US" sz="3200" dirty="0"/>
+          </a:p>
+          <a:p>
+            <a:pPr marL="457200" indent="-457200">
+              <a:buFont typeface="Arial" panose="020B0604020202020204" pitchFamily="34" charset="0"/>
+              <a:buChar char="•"/>
+            </a:pPr>
+            <a:r>
+              <a:rPr lang="en-US" sz="3200" dirty="0">
+                <a:hlinkClick r:id="rId3"/>
+              </a:rPr>
+              <a:t>www.ParkerSmart.com</a:t>
+            </a:r>
+            <a:r>
+              <a:rPr lang="en-US" sz="3200" dirty="0"/>
+              <a:t>			  </a:t>
+            </a:r>
+            <a:r>
+              <a:rPr lang="en-US" sz="3200" dirty="0">
+                <a:sym typeface="Wingdings" panose="05000000000000000000" pitchFamily="2" charset="2"/>
+              </a:rPr>
+              <a:t> </a:t>
+            </a:r>
+            <a:r>
+              <a:rPr lang="en-US" sz="3200" dirty="0">
+                <a:hlinkClick r:id="rId4"/>
+              </a:rPr>
+              <a:t>www.SpilledMilk.com</a:t>
+            </a:r>
+            <a:r>
+              <a:rPr lang="en-US" sz="3200" dirty="0"/>
+              <a:t> 		</a:t>
+            </a:r>
+          </a:p>
+          <a:p>
+            <a:pPr marL="914400" lvl="1" indent="-457200">
+              <a:buFont typeface="Arial" panose="020B0604020202020204" pitchFamily="34" charset="0"/>
+              <a:buChar char="•"/>
+            </a:pPr>
+            <a:r>
+              <a:rPr lang="en-US" sz="3200" dirty="0"/>
+              <a:t>Email</a:t>
+            </a:r>
+          </a:p>
+          <a:p>
+            <a:pPr marL="914400" lvl="1" indent="-457200">
+              <a:buFont typeface="Arial" panose="020B0604020202020204" pitchFamily="34" charset="0"/>
+              <a:buChar char="•"/>
+            </a:pPr>
+            <a:r>
+              <a:rPr lang="en-US" sz="3200" dirty="0"/>
+              <a:t>Twitter</a:t>
+            </a:r>
+          </a:p>
+          <a:p>
+            <a:pPr marL="914400" lvl="1" indent="-457200">
+              <a:buFont typeface="Arial" panose="020B0604020202020204" pitchFamily="34" charset="0"/>
+              <a:buChar char="•"/>
+            </a:pPr>
+            <a:r>
+              <a:rPr lang="en-US" sz="3200" dirty="0"/>
+              <a:t>Blog</a:t>
+            </a:r>
+          </a:p>
+          <a:p>
+            <a:pPr marL="914400" lvl="1" indent="-457200">
+              <a:buFont typeface="Arial" panose="020B0604020202020204" pitchFamily="34" charset="0"/>
+              <a:buChar char="•"/>
+            </a:pPr>
+            <a:r>
+              <a:rPr lang="en-US" sz="3200" dirty="0"/>
+              <a:t>Xbox Live</a:t>
+            </a:r>
+          </a:p>
+          <a:p>
+            <a:pPr marL="914400" lvl="1" indent="-457200">
+              <a:buFont typeface="Arial" panose="020B0604020202020204" pitchFamily="34" charset="0"/>
+              <a:buChar char="•"/>
+            </a:pPr>
+            <a:r>
+              <a:rPr lang="en-US" sz="3200" dirty="0"/>
+              <a:t>GitHub</a:t>
+            </a:r>
+          </a:p>
+        </p:txBody>
+      </p:sp>
+      <p:pic>
+        <p:nvPicPr>
+          <p:cNvPr id="4" name="Picture 3"/>
+          <p:cNvPicPr>
+            <a:picLocks noChangeAspect="1"/>
+          </p:cNvPicPr>
+          <p:nvPr/>
+        </p:nvPicPr>
+        <p:blipFill>
+          <a:blip r:embed="rId5"/>
+          <a:stretch>
+            <a:fillRect/>
+          </a:stretch>
+        </p:blipFill>
+        <p:spPr>
+          <a:xfrm>
+            <a:off x="7811713" y="3641108"/>
+            <a:ext cx="1340599" cy="1407630"/>
+          </a:xfrm>
+          <a:prstGeom prst="rect">
+            <a:avLst/>
+          </a:prstGeom>
+        </p:spPr>
+      </p:pic>
+    </p:spTree>
+    <p:extLst>
+      <p:ext uri="{BB962C8B-B14F-4D97-AF65-F5344CB8AC3E}">
+        <p14:creationId xmlns:p14="http://schemas.microsoft.com/office/powerpoint/2010/main" val="1221226079"/>
+      </p:ext>
+    </p:extLst>
+  </p:cSld>
+  <p:clrMapOvr>
+    <a:masterClrMapping/>
+  </p:clrMapOvr>
+</p:sld>
+</file>
+
 <file path=ppt/slides/slide2.xml><?xml version="1.0" encoding="utf-8"?>
 <p:sld xmlns:a="http://schemas.openxmlformats.org/drawingml/2006/main" xmlns:r="http://schemas.openxmlformats.org/officeDocument/2006/relationships" xmlns:p="http://schemas.openxmlformats.org/presentationml/2006/main">
   <p:cSld>
@@ -7426,7 +7638,7 @@
         <p:spPr>
           <a:xfrm>
             <a:off x="839585" y="2044931"/>
-            <a:ext cx="10532226" cy="4862870"/>
+            <a:ext cx="10532226" cy="4385816"/>
           </a:xfrm>
           <a:prstGeom prst="rect">
             <a:avLst/>
@@ -7518,7 +7730,7 @@
             </a:pPr>
             <a:r>
               <a:rPr lang="en-US" sz="3100" dirty="0"/>
-              <a:t>Thank you for attending, because you could have just downloaded all this from GitHub and skipped class…  I guess you still can!</a:t>
+              <a:t>You could have just downloaded all this from GitHub and skipped class…  I guess you still can!</a:t>
             </a:r>
           </a:p>
           <a:p>
@@ -7620,7 +7832,7 @@
             </a:pPr>
             <a:r>
               <a:rPr lang="en-US" sz="3200" dirty="0"/>
-              <a:t>Observations</a:t>
+              <a:t>Observations (yours or mine)</a:t>
             </a:r>
           </a:p>
           <a:p>
@@ -7748,7 +7960,7 @@
         <p:spPr>
           <a:xfrm>
             <a:off x="839585" y="2044931"/>
-            <a:ext cx="10532226" cy="3539430"/>
+            <a:ext cx="10532226" cy="4031873"/>
           </a:xfrm>
           <a:prstGeom prst="rect">
             <a:avLst/>
@@ -7777,7 +7989,18 @@
             </a:pPr>
             <a:r>
               <a:rPr lang="en-US" sz="3200" dirty="0"/>
-              <a:t>Code First? – Personal or Enterprise?...  Anybody?</a:t>
+              <a:t>Personal or Enterprise?</a:t>
+            </a:r>
+            <a:endParaRPr lang="en-US" sz="3200" dirty="0"/>
+          </a:p>
+          <a:p>
+            <a:pPr marL="457200" indent="-457200">
+              <a:buFont typeface="Arial" panose="020B0604020202020204" pitchFamily="34" charset="0"/>
+              <a:buChar char="•"/>
+            </a:pPr>
+            <a:r>
+              <a:rPr lang="en-US" sz="3200" dirty="0"/>
+              <a:t>Code First? –Anybody?</a:t>
             </a:r>
           </a:p>
           <a:p>

</xml_diff>